<commit_message>
chg: Added more TGTs (Thanks to Furface)
</commit_message>
<xml_diff>
--- a/OPAR/WORKSPACE/WIP Target Folders/OPARTGT035_International_Communications_Centre.pptx
+++ b/OPAR/WORKSPACE/WIP Target Folders/OPARTGT035_International_Communications_Centre.pptx
@@ -107,6 +107,22 @@
       </a:defRPr>
     </a:lvl9pPr>
   </p:defaultTextStyle>
+  <p:extLst>
+    <p:ext uri="{EFAFB233-063F-42B5-8137-9DF3F51BA10A}">
+      <p15:sldGuideLst xmlns:p15="http://schemas.microsoft.com/office/powerpoint/2012/main">
+        <p15:guide id="1" orient="horz" pos="1620">
+          <p15:clr>
+            <a:srgbClr val="A4A3A4"/>
+          </p15:clr>
+        </p15:guide>
+        <p15:guide id="2" pos="2880">
+          <p15:clr>
+            <a:srgbClr val="A4A3A4"/>
+          </p15:clr>
+        </p15:guide>
+      </p15:sldGuideLst>
+    </p:ext>
+  </p:extLst>
 </p:presentation>
 </file>
 
@@ -193,7 +209,7 @@
             <a:fld id="{40637A30-8EE1-4060-9976-8832FC89EE34}" type="datetimeFigureOut">
               <a:rPr lang="nb-NO" smtClean="0"/>
               <a:pPr/>
-              <a:t>29.11.2020</a:t>
+              <a:t>08.12.2020</a:t>
             </a:fld>
             <a:endParaRPr lang="nb-NO"/>
           </a:p>
@@ -259,38 +275,37 @@
           <a:p>
             <a:pPr lvl="0"/>
             <a:r>
-              <a:rPr lang="nb-NO" smtClean="0"/>
+              <a:rPr lang="nb-NO"/>
               <a:t>Klikk for å redigere tekststiler i malen</a:t>
             </a:r>
           </a:p>
           <a:p>
             <a:pPr lvl="1"/>
             <a:r>
-              <a:rPr lang="nb-NO" smtClean="0"/>
+              <a:rPr lang="nb-NO"/>
               <a:t>Andre nivå</a:t>
             </a:r>
           </a:p>
           <a:p>
             <a:pPr lvl="2"/>
             <a:r>
-              <a:rPr lang="nb-NO" smtClean="0"/>
+              <a:rPr lang="nb-NO"/>
               <a:t>Tredje nivå</a:t>
             </a:r>
           </a:p>
           <a:p>
             <a:pPr lvl="3"/>
             <a:r>
-              <a:rPr lang="nb-NO" smtClean="0"/>
+              <a:rPr lang="nb-NO"/>
               <a:t>Fjerde nivå</a:t>
             </a:r>
           </a:p>
           <a:p>
             <a:pPr lvl="4"/>
             <a:r>
-              <a:rPr lang="nb-NO" smtClean="0"/>
+              <a:rPr lang="nb-NO"/>
               <a:t>Femte nivå</a:t>
             </a:r>
-            <a:endParaRPr lang="nb-NO"/>
           </a:p>
         </p:txBody>
       </p:sp>
@@ -497,10 +512,9 @@
           <a:lstStyle/>
           <a:p>
             <a:r>
-              <a:rPr lang="nb-NO" smtClean="0"/>
+              <a:rPr lang="nb-NO"/>
               <a:t>Klikk for å redigere tittelstil</a:t>
             </a:r>
-            <a:endParaRPr lang="nb-NO"/>
           </a:p>
         </p:txBody>
       </p:sp>
@@ -616,10 +630,9 @@
           </a:lstStyle>
           <a:p>
             <a:r>
-              <a:rPr lang="nb-NO" smtClean="0"/>
+              <a:rPr lang="nb-NO"/>
               <a:t>Klikk for å redigere undertittelstil i malen</a:t>
             </a:r>
-            <a:endParaRPr lang="nb-NO"/>
           </a:p>
         </p:txBody>
       </p:sp>
@@ -759,10 +772,9 @@
           </a:lstStyle>
           <a:p>
             <a:r>
-              <a:rPr lang="nb-NO" smtClean="0"/>
+              <a:rPr lang="nb-NO"/>
               <a:t>Klikk for å redigere tittelstil</a:t>
             </a:r>
-            <a:endParaRPr lang="nb-NO"/>
           </a:p>
         </p:txBody>
       </p:sp>
@@ -886,7 +898,7 @@
           <a:p>
             <a:pPr lvl="0"/>
             <a:r>
-              <a:rPr lang="nb-NO" smtClean="0"/>
+              <a:rPr lang="nb-NO"/>
               <a:t>Klikk for å redigere tekststiler i malen</a:t>
             </a:r>
           </a:p>
@@ -1019,10 +1031,9 @@
           <a:lstStyle/>
           <a:p>
             <a:r>
-              <a:rPr lang="nb-NO" smtClean="0"/>
+              <a:rPr lang="nb-NO"/>
               <a:t>Klikk for å redigere tittelstil</a:t>
             </a:r>
-            <a:endParaRPr lang="nb-NO"/>
           </a:p>
         </p:txBody>
       </p:sp>
@@ -1043,38 +1054,37 @@
           <a:p>
             <a:pPr lvl="0"/>
             <a:r>
-              <a:rPr lang="nb-NO" smtClean="0"/>
+              <a:rPr lang="nb-NO"/>
               <a:t>Klikk for å redigere tekststiler i malen</a:t>
             </a:r>
           </a:p>
           <a:p>
             <a:pPr lvl="1"/>
             <a:r>
-              <a:rPr lang="nb-NO" smtClean="0"/>
+              <a:rPr lang="nb-NO"/>
               <a:t>Andre nivå</a:t>
             </a:r>
           </a:p>
           <a:p>
             <a:pPr lvl="2"/>
             <a:r>
-              <a:rPr lang="nb-NO" smtClean="0"/>
+              <a:rPr lang="nb-NO"/>
               <a:t>Tredje nivå</a:t>
             </a:r>
           </a:p>
           <a:p>
             <a:pPr lvl="3"/>
             <a:r>
-              <a:rPr lang="nb-NO" smtClean="0"/>
+              <a:rPr lang="nb-NO"/>
               <a:t>Fjerde nivå</a:t>
             </a:r>
           </a:p>
           <a:p>
             <a:pPr lvl="4"/>
             <a:r>
-              <a:rPr lang="nb-NO" smtClean="0"/>
+              <a:rPr lang="nb-NO"/>
               <a:t>Femte nivå</a:t>
             </a:r>
-            <a:endParaRPr lang="nb-NO"/>
           </a:p>
         </p:txBody>
       </p:sp>
@@ -1210,10 +1220,9 @@
           <a:lstStyle/>
           <a:p>
             <a:r>
-              <a:rPr lang="nb-NO" smtClean="0"/>
+              <a:rPr lang="nb-NO"/>
               <a:t>Klikk for å redigere tittelstil</a:t>
             </a:r>
-            <a:endParaRPr lang="nb-NO"/>
           </a:p>
         </p:txBody>
       </p:sp>
@@ -1239,38 +1248,37 @@
           <a:p>
             <a:pPr lvl="0"/>
             <a:r>
-              <a:rPr lang="nb-NO" smtClean="0"/>
+              <a:rPr lang="nb-NO"/>
               <a:t>Klikk for å redigere tekststiler i malen</a:t>
             </a:r>
           </a:p>
           <a:p>
             <a:pPr lvl="1"/>
             <a:r>
-              <a:rPr lang="nb-NO" smtClean="0"/>
+              <a:rPr lang="nb-NO"/>
               <a:t>Andre nivå</a:t>
             </a:r>
           </a:p>
           <a:p>
             <a:pPr lvl="2"/>
             <a:r>
-              <a:rPr lang="nb-NO" smtClean="0"/>
+              <a:rPr lang="nb-NO"/>
               <a:t>Tredje nivå</a:t>
             </a:r>
           </a:p>
           <a:p>
             <a:pPr lvl="3"/>
             <a:r>
-              <a:rPr lang="nb-NO" smtClean="0"/>
+              <a:rPr lang="nb-NO"/>
               <a:t>Fjerde nivå</a:t>
             </a:r>
           </a:p>
           <a:p>
             <a:pPr lvl="4"/>
             <a:r>
-              <a:rPr lang="nb-NO" smtClean="0"/>
+              <a:rPr lang="nb-NO"/>
               <a:t>Femte nivå</a:t>
             </a:r>
-            <a:endParaRPr lang="nb-NO"/>
           </a:p>
         </p:txBody>
       </p:sp>
@@ -1410,10 +1418,9 @@
           </a:lstStyle>
           <a:p>
             <a:r>
-              <a:rPr lang="nb-NO" dirty="0" smtClean="0"/>
+              <a:rPr lang="nb-NO" dirty="0"/>
               <a:t>Klikk for å redigere tittelstil</a:t>
             </a:r>
-            <a:endParaRPr lang="nb-NO" dirty="0"/>
           </a:p>
         </p:txBody>
       </p:sp>
@@ -1463,10 +1470,9 @@
           <a:lstStyle/>
           <a:p>
             <a:r>
-              <a:rPr lang="nb-NO" smtClean="0"/>
+              <a:rPr lang="nb-NO"/>
               <a:t>Klikk for å redigere tittelstil</a:t>
             </a:r>
-            <a:endParaRPr lang="nb-NO"/>
           </a:p>
         </p:txBody>
       </p:sp>
@@ -1492,38 +1498,37 @@
           <a:p>
             <a:pPr lvl="0"/>
             <a:r>
-              <a:rPr lang="nb-NO" smtClean="0"/>
+              <a:rPr lang="nb-NO"/>
               <a:t>Klikk for å redigere tekststiler i malen</a:t>
             </a:r>
           </a:p>
           <a:p>
             <a:pPr lvl="1"/>
             <a:r>
-              <a:rPr lang="nb-NO" smtClean="0"/>
+              <a:rPr lang="nb-NO"/>
               <a:t>Andre nivå</a:t>
             </a:r>
           </a:p>
           <a:p>
             <a:pPr lvl="2"/>
             <a:r>
-              <a:rPr lang="nb-NO" smtClean="0"/>
+              <a:rPr lang="nb-NO"/>
               <a:t>Tredje nivå</a:t>
             </a:r>
           </a:p>
           <a:p>
             <a:pPr lvl="3"/>
             <a:r>
-              <a:rPr lang="nb-NO" smtClean="0"/>
+              <a:rPr lang="nb-NO"/>
               <a:t>Fjerde nivå</a:t>
             </a:r>
           </a:p>
           <a:p>
             <a:pPr lvl="4"/>
             <a:r>
-              <a:rPr lang="nb-NO" smtClean="0"/>
+              <a:rPr lang="nb-NO"/>
               <a:t>Femte nivå</a:t>
             </a:r>
-            <a:endParaRPr lang="nb-NO"/>
           </a:p>
         </p:txBody>
       </p:sp>
@@ -1577,10 +1582,9 @@
           </a:lstStyle>
           <a:p>
             <a:r>
-              <a:rPr lang="nb-NO" smtClean="0"/>
+              <a:rPr lang="nb-NO"/>
               <a:t>Klikk for å redigere tittelstil</a:t>
             </a:r>
-            <a:endParaRPr lang="nb-NO"/>
           </a:p>
         </p:txBody>
       </p:sp>
@@ -1697,7 +1701,7 @@
           <a:p>
             <a:pPr lvl="0"/>
             <a:r>
-              <a:rPr lang="nb-NO" smtClean="0"/>
+              <a:rPr lang="nb-NO"/>
               <a:t>Klikk for å redigere tekststiler i malen</a:t>
             </a:r>
           </a:p>
@@ -1830,10 +1834,9 @@
           <a:lstStyle/>
           <a:p>
             <a:r>
-              <a:rPr lang="nb-NO" smtClean="0"/>
+              <a:rPr lang="nb-NO"/>
               <a:t>Klikk for å redigere tittelstil</a:t>
             </a:r>
-            <a:endParaRPr lang="nb-NO"/>
           </a:p>
         </p:txBody>
       </p:sp>
@@ -1887,38 +1890,37 @@
           <a:p>
             <a:pPr lvl="0"/>
             <a:r>
-              <a:rPr lang="nb-NO" smtClean="0"/>
+              <a:rPr lang="nb-NO"/>
               <a:t>Klikk for å redigere tekststiler i malen</a:t>
             </a:r>
           </a:p>
           <a:p>
             <a:pPr lvl="1"/>
             <a:r>
-              <a:rPr lang="nb-NO" smtClean="0"/>
+              <a:rPr lang="nb-NO"/>
               <a:t>Andre nivå</a:t>
             </a:r>
           </a:p>
           <a:p>
             <a:pPr lvl="2"/>
             <a:r>
-              <a:rPr lang="nb-NO" smtClean="0"/>
+              <a:rPr lang="nb-NO"/>
               <a:t>Tredje nivå</a:t>
             </a:r>
           </a:p>
           <a:p>
             <a:pPr lvl="3"/>
             <a:r>
-              <a:rPr lang="nb-NO" smtClean="0"/>
+              <a:rPr lang="nb-NO"/>
               <a:t>Fjerde nivå</a:t>
             </a:r>
           </a:p>
           <a:p>
             <a:pPr lvl="4"/>
             <a:r>
-              <a:rPr lang="nb-NO" smtClean="0"/>
+              <a:rPr lang="nb-NO"/>
               <a:t>Femte nivå</a:t>
             </a:r>
-            <a:endParaRPr lang="nb-NO"/>
           </a:p>
         </p:txBody>
       </p:sp>
@@ -1972,38 +1974,37 @@
           <a:p>
             <a:pPr lvl="0"/>
             <a:r>
-              <a:rPr lang="nb-NO" smtClean="0"/>
+              <a:rPr lang="nb-NO"/>
               <a:t>Klikk for å redigere tekststiler i malen</a:t>
             </a:r>
           </a:p>
           <a:p>
             <a:pPr lvl="1"/>
             <a:r>
-              <a:rPr lang="nb-NO" smtClean="0"/>
+              <a:rPr lang="nb-NO"/>
               <a:t>Andre nivå</a:t>
             </a:r>
           </a:p>
           <a:p>
             <a:pPr lvl="2"/>
             <a:r>
-              <a:rPr lang="nb-NO" smtClean="0"/>
+              <a:rPr lang="nb-NO"/>
               <a:t>Tredje nivå</a:t>
             </a:r>
           </a:p>
           <a:p>
             <a:pPr lvl="3"/>
             <a:r>
-              <a:rPr lang="nb-NO" smtClean="0"/>
+              <a:rPr lang="nb-NO"/>
               <a:t>Fjerde nivå</a:t>
             </a:r>
           </a:p>
           <a:p>
             <a:pPr lvl="4"/>
             <a:r>
-              <a:rPr lang="nb-NO" smtClean="0"/>
+              <a:rPr lang="nb-NO"/>
               <a:t>Femte nivå</a:t>
             </a:r>
-            <a:endParaRPr lang="nb-NO"/>
           </a:p>
         </p:txBody>
       </p:sp>
@@ -2138,10 +2139,9 @@
           </a:lstStyle>
           <a:p>
             <a:r>
-              <a:rPr lang="nb-NO" smtClean="0"/>
+              <a:rPr lang="nb-NO"/>
               <a:t>Klikk for å redigere tittelstil</a:t>
             </a:r>
-            <a:endParaRPr lang="nb-NO"/>
           </a:p>
         </p:txBody>
       </p:sp>
@@ -2204,7 +2204,7 @@
           <a:p>
             <a:pPr lvl="0"/>
             <a:r>
-              <a:rPr lang="nb-NO" smtClean="0"/>
+              <a:rPr lang="nb-NO"/>
               <a:t>Klikk for å redigere tekststiler i malen</a:t>
             </a:r>
           </a:p>
@@ -2260,38 +2260,37 @@
           <a:p>
             <a:pPr lvl="0"/>
             <a:r>
-              <a:rPr lang="nb-NO" smtClean="0"/>
+              <a:rPr lang="nb-NO"/>
               <a:t>Klikk for å redigere tekststiler i malen</a:t>
             </a:r>
           </a:p>
           <a:p>
             <a:pPr lvl="1"/>
             <a:r>
-              <a:rPr lang="nb-NO" smtClean="0"/>
+              <a:rPr lang="nb-NO"/>
               <a:t>Andre nivå</a:t>
             </a:r>
           </a:p>
           <a:p>
             <a:pPr lvl="2"/>
             <a:r>
-              <a:rPr lang="nb-NO" smtClean="0"/>
+              <a:rPr lang="nb-NO"/>
               <a:t>Tredje nivå</a:t>
             </a:r>
           </a:p>
           <a:p>
             <a:pPr lvl="3"/>
             <a:r>
-              <a:rPr lang="nb-NO" smtClean="0"/>
+              <a:rPr lang="nb-NO"/>
               <a:t>Fjerde nivå</a:t>
             </a:r>
           </a:p>
           <a:p>
             <a:pPr lvl="4"/>
             <a:r>
-              <a:rPr lang="nb-NO" smtClean="0"/>
+              <a:rPr lang="nb-NO"/>
               <a:t>Femte nivå</a:t>
             </a:r>
-            <a:endParaRPr lang="nb-NO"/>
           </a:p>
         </p:txBody>
       </p:sp>
@@ -2354,7 +2353,7 @@
           <a:p>
             <a:pPr lvl="0"/>
             <a:r>
-              <a:rPr lang="nb-NO" smtClean="0"/>
+              <a:rPr lang="nb-NO"/>
               <a:t>Klikk for å redigere tekststiler i malen</a:t>
             </a:r>
           </a:p>
@@ -2410,38 +2409,37 @@
           <a:p>
             <a:pPr lvl="0"/>
             <a:r>
-              <a:rPr lang="nb-NO" smtClean="0"/>
+              <a:rPr lang="nb-NO"/>
               <a:t>Klikk for å redigere tekststiler i malen</a:t>
             </a:r>
           </a:p>
           <a:p>
             <a:pPr lvl="1"/>
             <a:r>
-              <a:rPr lang="nb-NO" smtClean="0"/>
+              <a:rPr lang="nb-NO"/>
               <a:t>Andre nivå</a:t>
             </a:r>
           </a:p>
           <a:p>
             <a:pPr lvl="2"/>
             <a:r>
-              <a:rPr lang="nb-NO" smtClean="0"/>
+              <a:rPr lang="nb-NO"/>
               <a:t>Tredje nivå</a:t>
             </a:r>
           </a:p>
           <a:p>
             <a:pPr lvl="3"/>
             <a:r>
-              <a:rPr lang="nb-NO" smtClean="0"/>
+              <a:rPr lang="nb-NO"/>
               <a:t>Fjerde nivå</a:t>
             </a:r>
           </a:p>
           <a:p>
             <a:pPr lvl="4"/>
             <a:r>
-              <a:rPr lang="nb-NO" smtClean="0"/>
+              <a:rPr lang="nb-NO"/>
               <a:t>Femte nivå</a:t>
             </a:r>
-            <a:endParaRPr lang="nb-NO"/>
           </a:p>
         </p:txBody>
       </p:sp>
@@ -2586,10 +2584,9 @@
           <a:lstStyle/>
           <a:p>
             <a:r>
-              <a:rPr lang="nb-NO" smtClean="0"/>
+              <a:rPr lang="nb-NO"/>
               <a:t>Klikk for å redigere tittelstil</a:t>
             </a:r>
-            <a:endParaRPr lang="nb-NO"/>
           </a:p>
         </p:txBody>
       </p:sp>
@@ -2844,10 +2841,9 @@
           </a:lstStyle>
           <a:p>
             <a:r>
-              <a:rPr lang="nb-NO" smtClean="0"/>
+              <a:rPr lang="nb-NO"/>
               <a:t>Klikk for å redigere tittelstil</a:t>
             </a:r>
-            <a:endParaRPr lang="nb-NO"/>
           </a:p>
         </p:txBody>
       </p:sp>
@@ -2901,38 +2897,37 @@
           <a:p>
             <a:pPr lvl="0"/>
             <a:r>
-              <a:rPr lang="nb-NO" smtClean="0"/>
+              <a:rPr lang="nb-NO"/>
               <a:t>Klikk for å redigere tekststiler i malen</a:t>
             </a:r>
           </a:p>
           <a:p>
             <a:pPr lvl="1"/>
             <a:r>
-              <a:rPr lang="nb-NO" smtClean="0"/>
+              <a:rPr lang="nb-NO"/>
               <a:t>Andre nivå</a:t>
             </a:r>
           </a:p>
           <a:p>
             <a:pPr lvl="2"/>
             <a:r>
-              <a:rPr lang="nb-NO" smtClean="0"/>
+              <a:rPr lang="nb-NO"/>
               <a:t>Tredje nivå</a:t>
             </a:r>
           </a:p>
           <a:p>
             <a:pPr lvl="3"/>
             <a:r>
-              <a:rPr lang="nb-NO" smtClean="0"/>
+              <a:rPr lang="nb-NO"/>
               <a:t>Fjerde nivå</a:t>
             </a:r>
           </a:p>
           <a:p>
             <a:pPr lvl="4"/>
             <a:r>
-              <a:rPr lang="nb-NO" smtClean="0"/>
+              <a:rPr lang="nb-NO"/>
               <a:t>Femte nivå</a:t>
             </a:r>
-            <a:endParaRPr lang="nb-NO"/>
           </a:p>
         </p:txBody>
       </p:sp>
@@ -2995,7 +2990,7 @@
           <a:p>
             <a:pPr lvl="0"/>
             <a:r>
-              <a:rPr lang="nb-NO" smtClean="0"/>
+              <a:rPr lang="nb-NO"/>
               <a:t>Klikk for å redigere tekststiler i malen</a:t>
             </a:r>
           </a:p>
@@ -3148,10 +3143,9 @@
           <a:lstStyle/>
           <a:p>
             <a:r>
-              <a:rPr lang="nb-NO" dirty="0" smtClean="0"/>
+              <a:rPr lang="nb-NO" dirty="0"/>
               <a:t>Klikk for å redigere tittelstil</a:t>
             </a:r>
-            <a:endParaRPr lang="nb-NO" dirty="0"/>
           </a:p>
         </p:txBody>
       </p:sp>
@@ -3182,38 +3176,37 @@
           <a:p>
             <a:pPr lvl="0"/>
             <a:r>
-              <a:rPr lang="nb-NO" dirty="0" smtClean="0"/>
+              <a:rPr lang="nb-NO" dirty="0"/>
               <a:t>Klikk for å redigere tekststiler i malen</a:t>
             </a:r>
           </a:p>
           <a:p>
             <a:pPr lvl="1"/>
             <a:r>
-              <a:rPr lang="nb-NO" dirty="0" smtClean="0"/>
+              <a:rPr lang="nb-NO" dirty="0"/>
               <a:t>Andre nivå</a:t>
             </a:r>
           </a:p>
           <a:p>
             <a:pPr lvl="2"/>
             <a:r>
-              <a:rPr lang="nb-NO" dirty="0" smtClean="0"/>
+              <a:rPr lang="nb-NO" dirty="0"/>
               <a:t>Tredje nivå</a:t>
             </a:r>
           </a:p>
           <a:p>
             <a:pPr lvl="3"/>
             <a:r>
-              <a:rPr lang="nb-NO" dirty="0" smtClean="0"/>
+              <a:rPr lang="nb-NO" dirty="0"/>
               <a:t>Fjerde nivå</a:t>
             </a:r>
           </a:p>
           <a:p>
             <a:pPr lvl="4"/>
             <a:r>
-              <a:rPr lang="nb-NO" dirty="0" smtClean="0"/>
+              <a:rPr lang="nb-NO" dirty="0"/>
               <a:t>Femte nivå</a:t>
             </a:r>
-            <a:endParaRPr lang="nb-NO" dirty="0"/>
           </a:p>
         </p:txBody>
       </p:sp>
@@ -3366,7 +3359,7 @@
           <a:lstStyle/>
           <a:p>
             <a:r>
-              <a:rPr lang="nb-NO" sz="1000" b="0" dirty="0" err="1" smtClean="0">
+              <a:rPr lang="nb-NO" sz="1000" b="0" dirty="0" err="1">
                 <a:solidFill>
                   <a:schemeClr val="tx1"/>
                 </a:solidFill>
@@ -3376,7 +3369,7 @@
               <a:t>Virtual</a:t>
             </a:r>
             <a:r>
-              <a:rPr lang="nb-NO" sz="1000" b="0" dirty="0" smtClean="0">
+              <a:rPr lang="nb-NO" sz="1000" b="0" dirty="0">
                 <a:solidFill>
                   <a:schemeClr val="tx1"/>
                 </a:solidFill>
@@ -3386,7 +3379,7 @@
               <a:t> </a:t>
             </a:r>
             <a:r>
-              <a:rPr lang="nb-NO" sz="1000" b="0" dirty="0" err="1" smtClean="0">
+              <a:rPr lang="nb-NO" sz="1000" b="0" dirty="0" err="1">
                 <a:solidFill>
                   <a:schemeClr val="tx1"/>
                 </a:solidFill>
@@ -3396,7 +3389,7 @@
               <a:t>Intelligence</a:t>
             </a:r>
             <a:r>
-              <a:rPr lang="nb-NO" sz="1000" b="0" dirty="0" smtClean="0">
+              <a:rPr lang="nb-NO" sz="1000" b="0" dirty="0">
                 <a:solidFill>
                   <a:schemeClr val="tx1"/>
                 </a:solidFill>
@@ -3405,13 +3398,6 @@
               </a:rPr>
               <a:t> Service</a:t>
             </a:r>
-            <a:endParaRPr lang="nb-NO" sz="1000" b="0" dirty="0">
-              <a:solidFill>
-                <a:schemeClr val="tx1"/>
-              </a:solidFill>
-              <a:latin typeface="Arial Black" pitchFamily="34" charset="0"/>
-              <a:cs typeface="Arial" pitchFamily="34" charset="0"/>
-            </a:endParaRPr>
           </a:p>
         </p:txBody>
       </p:sp>
@@ -3439,7 +3425,7 @@
           <a:p>
             <a:pPr algn="ctr"/>
             <a:r>
-              <a:rPr lang="nb-NO" sz="700" b="1" dirty="0" smtClean="0">
+              <a:rPr lang="nb-NO" sz="700" b="1" dirty="0">
                 <a:solidFill>
                   <a:schemeClr val="bg1"/>
                 </a:solidFill>
@@ -3448,7 +3434,7 @@
               <a:t>Victoria</a:t>
             </a:r>
             <a:r>
-              <a:rPr lang="nb-NO" sz="700" b="1" baseline="0" dirty="0" smtClean="0">
+              <a:rPr lang="nb-NO" sz="700" b="1" baseline="0" dirty="0">
                 <a:solidFill>
                   <a:schemeClr val="bg1"/>
                 </a:solidFill>
@@ -3457,7 +3443,7 @@
               <a:t> Per </a:t>
             </a:r>
             <a:r>
-              <a:rPr lang="nb-NO" sz="700" b="1" baseline="0" dirty="0" err="1" smtClean="0">
+              <a:rPr lang="nb-NO" sz="700" b="1" baseline="0" dirty="0" err="1">
                 <a:solidFill>
                   <a:schemeClr val="bg1"/>
                 </a:solidFill>
@@ -3810,6 +3796,30 @@
       </p:grpSpPr>
       <p:pic>
         <p:nvPicPr>
+          <p:cNvPr id="43" name="Picture 42" descr="Screen_201129_154014.png"/>
+          <p:cNvPicPr>
+            <a:picLocks noChangeAspect="1"/>
+          </p:cNvPicPr>
+          <p:nvPr/>
+        </p:nvPicPr>
+        <p:blipFill>
+          <a:blip r:embed="rId2" cstate="print"/>
+          <a:stretch>
+            <a:fillRect/>
+          </a:stretch>
+        </p:blipFill>
+        <p:spPr>
+          <a:xfrm>
+            <a:off x="25756" y="843558"/>
+            <a:ext cx="5652120" cy="3744416"/>
+          </a:xfrm>
+          <a:prstGeom prst="rect">
+            <a:avLst/>
+          </a:prstGeom>
+        </p:spPr>
+      </p:pic>
+      <p:pic>
+        <p:nvPicPr>
           <p:cNvPr id="1026" name="Picture 2" descr="C:\Users\HARDC\Saved Games\DCS.openbeta\ScreenShots\Screen_200824_212755.png"/>
           <p:cNvPicPr>
             <a:picLocks noChangeAspect="1" noChangeArrowheads="1"/>
@@ -3817,7 +3827,7 @@
           <p:nvPr/>
         </p:nvPicPr>
         <p:blipFill>
-          <a:blip r:embed="rId2" cstate="print"/>
+          <a:blip r:embed="rId3" cstate="print"/>
           <a:srcRect l="18066" t="16894" r="16015" b="9862"/>
           <a:stretch>
             <a:fillRect/>
@@ -3863,10 +3873,9 @@
           <a:lstStyle/>
           <a:p>
             <a:r>
-              <a:rPr lang="en-US" dirty="0" smtClean="0"/>
+              <a:rPr lang="en-US" dirty="0"/>
               <a:t>OPARTGT035 International communication center </a:t>
             </a:r>
-            <a:endParaRPr lang="en-US" dirty="0"/>
           </a:p>
         </p:txBody>
       </p:sp>
@@ -3913,10 +3922,9 @@
           <a:p>
             <a:pPr algn="ctr"/>
             <a:r>
-              <a:rPr lang="nb-NO" dirty="0" smtClean="0"/>
+              <a:rPr lang="nb-NO" dirty="0"/>
               <a:t>N</a:t>
             </a:r>
-            <a:endParaRPr lang="nb-NO" dirty="0"/>
           </a:p>
         </p:txBody>
       </p:sp>
@@ -3990,7 +3998,7 @@
           <a:p>
             <a:pPr algn="ctr"/>
             <a:r>
-              <a:rPr lang="en-GB" sz="1400" dirty="0" smtClean="0">
+              <a:rPr lang="en-GB" sz="1400" dirty="0">
                 <a:solidFill>
                   <a:srgbClr val="FF0000"/>
                 </a:solidFill>
@@ -4045,7 +4053,7 @@
             <a:p>
               <a:pPr algn="ctr"/>
               <a:r>
-                <a:rPr lang="en-US" sz="1000" dirty="0" smtClean="0">
+                <a:rPr lang="en-US" sz="1000" dirty="0">
                   <a:solidFill>
                     <a:srgbClr val="FF0000"/>
                   </a:solidFill>
@@ -4053,12 +4061,6 @@
                 </a:rPr>
                 <a:t>4</a:t>
               </a:r>
-              <a:endParaRPr lang="en-US" sz="1000" dirty="0">
-                <a:solidFill>
-                  <a:srgbClr val="FF0000"/>
-                </a:solidFill>
-                <a:latin typeface="Arial Black" pitchFamily="34" charset="0"/>
-              </a:endParaRPr>
             </a:p>
           </p:txBody>
         </p:sp>
@@ -4147,7 +4149,7 @@
             <a:p>
               <a:pPr algn="ctr"/>
               <a:r>
-                <a:rPr lang="en-US" sz="1000" dirty="0" smtClean="0">
+                <a:rPr lang="en-US" sz="1000" dirty="0">
                   <a:solidFill>
                     <a:srgbClr val="FF0000"/>
                   </a:solidFill>
@@ -4155,12 +4157,6 @@
                 </a:rPr>
                 <a:t>5</a:t>
               </a:r>
-              <a:endParaRPr lang="en-US" sz="1000" dirty="0">
-                <a:solidFill>
-                  <a:srgbClr val="FF0000"/>
-                </a:solidFill>
-                <a:latin typeface="Arial Black" pitchFamily="34" charset="0"/>
-              </a:endParaRPr>
             </a:p>
           </p:txBody>
         </p:sp>
@@ -4249,7 +4245,7 @@
             <a:p>
               <a:pPr algn="ctr"/>
               <a:r>
-                <a:rPr lang="en-US" sz="1000" dirty="0" smtClean="0">
+                <a:rPr lang="en-US" sz="1000" dirty="0">
                   <a:solidFill>
                     <a:srgbClr val="FF0000"/>
                   </a:solidFill>
@@ -4257,12 +4253,6 @@
                 </a:rPr>
                 <a:t>6</a:t>
               </a:r>
-              <a:endParaRPr lang="en-US" sz="1000" dirty="0">
-                <a:solidFill>
-                  <a:srgbClr val="FF0000"/>
-                </a:solidFill>
-                <a:latin typeface="Arial Black" pitchFamily="34" charset="0"/>
-              </a:endParaRPr>
             </a:p>
           </p:txBody>
         </p:sp>
@@ -4351,7 +4341,7 @@
             <a:p>
               <a:pPr algn="ctr"/>
               <a:r>
-                <a:rPr lang="en-US" sz="1000" dirty="0" smtClean="0">
+                <a:rPr lang="en-US" sz="1000" dirty="0">
                   <a:solidFill>
                     <a:srgbClr val="FF0000"/>
                   </a:solidFill>
@@ -4359,12 +4349,6 @@
                 </a:rPr>
                 <a:t>7</a:t>
               </a:r>
-              <a:endParaRPr lang="en-US" sz="1000" dirty="0">
-                <a:solidFill>
-                  <a:srgbClr val="FF0000"/>
-                </a:solidFill>
-                <a:latin typeface="Arial Black" pitchFamily="34" charset="0"/>
-              </a:endParaRPr>
             </a:p>
           </p:txBody>
         </p:sp>
@@ -4453,7 +4437,7 @@
             <a:p>
               <a:pPr algn="ctr"/>
               <a:r>
-                <a:rPr lang="en-US" sz="1000" dirty="0" smtClean="0">
+                <a:rPr lang="en-US" sz="1000" dirty="0">
                   <a:solidFill>
                     <a:srgbClr val="FF0000"/>
                   </a:solidFill>
@@ -4461,12 +4445,6 @@
                 </a:rPr>
                 <a:t>8</a:t>
               </a:r>
-              <a:endParaRPr lang="en-US" sz="1000" dirty="0">
-                <a:solidFill>
-                  <a:srgbClr val="FF0000"/>
-                </a:solidFill>
-                <a:latin typeface="Arial Black" pitchFamily="34" charset="0"/>
-              </a:endParaRPr>
             </a:p>
           </p:txBody>
         </p:sp>
@@ -4540,69 +4518,145 @@
         </p:spPr>
         <p:txBody>
           <a:bodyPr wrap="square" rtlCol="0">
-            <a:normAutofit/>
+            <a:normAutofit lnSpcReduction="10000"/>
           </a:bodyPr>
           <a:lstStyle/>
           <a:p>
             <a:r>
-              <a:rPr lang="nb-NO" sz="1200" dirty="0" smtClean="0"/>
+              <a:rPr lang="nb-NO" sz="1200" dirty="0"/>
               <a:t>DESCRIPTION OF THE DESIRED POINTS OF IMPACT WITH WPN TYPE: </a:t>
             </a:r>
-            <a:endParaRPr lang="pl-PL" sz="1200" dirty="0" smtClean="0"/>
+            <a:endParaRPr lang="pl-PL" sz="1200" dirty="0"/>
           </a:p>
           <a:p>
             <a:pPr algn="ctr"/>
-            <a:endParaRPr lang="en-US" sz="1100" dirty="0" smtClean="0"/>
+            <a:endParaRPr lang="en-US" sz="1100" dirty="0"/>
           </a:p>
           <a:p>
             <a:pPr algn="ctr"/>
             <a:r>
-              <a:rPr lang="en-US" sz="1100" dirty="0" smtClean="0"/>
+              <a:rPr lang="en-US" sz="1100" dirty="0"/>
               <a:t>OPARTGT0</a:t>
             </a:r>
             <a:r>
-              <a:rPr lang="en-GB" sz="1100" dirty="0" smtClean="0"/>
-              <a:t>35 – Communications Centre</a:t>
+              <a:rPr lang="en-GB" sz="1100" dirty="0"/>
+              <a:t>35</a:t>
+            </a:r>
+            <a:r>
+              <a:rPr lang="en-GB" sz="1100" b="1" dirty="0"/>
+              <a:t>A</a:t>
+            </a:r>
+            <a:r>
+              <a:rPr lang="en-GB" sz="1100" dirty="0"/>
+              <a:t> – Propaganda</a:t>
             </a:r>
           </a:p>
           <a:p>
             <a:pPr algn="ctr"/>
-            <a:endParaRPr lang="pl-PL" sz="1200" dirty="0" smtClean="0"/>
-          </a:p>
-          <a:p>
-            <a:r>
-              <a:rPr lang="pl-PL" sz="1100" dirty="0" smtClean="0"/>
+            <a:endParaRPr lang="en-GB" sz="1100" dirty="0"/>
+          </a:p>
+          <a:p>
+            <a:pPr algn="ctr"/>
+            <a:r>
+              <a:rPr lang="pl-PL" sz="1100" dirty="0"/>
               <a:t>DPI 1 </a:t>
             </a:r>
             <a:r>
-              <a:rPr lang="en-US" sz="1100" dirty="0" smtClean="0"/>
-              <a:t>N33 30.742 </a:t>
-            </a:r>
-            <a:r>
-              <a:rPr lang="pl-PL" sz="1100" dirty="0" smtClean="0"/>
+              <a:rPr lang="en-US" sz="1100" dirty="0"/>
+              <a:t>N33 30.755 </a:t>
+            </a:r>
+            <a:r>
+              <a:rPr lang="pl-PL" sz="1100" dirty="0"/>
               <a:t> </a:t>
             </a:r>
             <a:r>
-              <a:rPr lang="en-US" sz="1100" dirty="0" smtClean="0"/>
-              <a:t>E036 16.697 </a:t>
-            </a:r>
-            <a:r>
-              <a:rPr lang="pl-PL" sz="1100" dirty="0" smtClean="0"/>
+              <a:rPr lang="en-US" sz="1100" dirty="0"/>
+              <a:t>E036 16.690</a:t>
+            </a:r>
+            <a:r>
+              <a:rPr lang="pl-PL" sz="1100" dirty="0"/>
               <a:t>/</a:t>
             </a:r>
             <a:r>
-              <a:rPr lang="en-US" sz="1100" dirty="0" smtClean="0"/>
+              <a:rPr lang="en-US" sz="1100" dirty="0"/>
               <a:t>2260ft</a:t>
             </a:r>
             <a:r>
-              <a:rPr lang="pl-PL" sz="1100" dirty="0" smtClean="0"/>
+              <a:rPr lang="pl-PL" sz="1100" dirty="0"/>
               <a:t>/</a:t>
             </a:r>
             <a:r>
-              <a:rPr lang="nb-NO" sz="1100" dirty="0" smtClean="0"/>
-              <a:t>(500Ibs bomb – multiple required spread across the structure)</a:t>
-            </a:r>
-            <a:endParaRPr lang="pl-PL" sz="1100" dirty="0" smtClean="0"/>
+              <a:rPr lang="nb-NO" sz="1100" dirty="0"/>
+              <a:t>(500 Ibs bombs)</a:t>
+            </a:r>
+          </a:p>
+          <a:p>
+            <a:pPr algn="ctr"/>
+            <a:r>
+              <a:rPr lang="nb-NO" sz="1100" dirty="0"/>
+              <a:t>DPI 2 N33 30.747  E036 16.703/2260ft/(500 lbs bombs)</a:t>
+            </a:r>
+          </a:p>
+          <a:p>
+            <a:endParaRPr lang="nb-NO" sz="1100" dirty="0"/>
+          </a:p>
+          <a:p>
+            <a:pPr algn="ctr"/>
+            <a:r>
+              <a:rPr lang="nb-NO" sz="1100" dirty="0"/>
+              <a:t>OPARTGT035</a:t>
+            </a:r>
+            <a:r>
+              <a:rPr lang="nb-NO" sz="1100" b="1" dirty="0"/>
+              <a:t>B</a:t>
+            </a:r>
+            <a:r>
+              <a:rPr lang="nb-NO" sz="1100" dirty="0"/>
+              <a:t> – Servers</a:t>
+            </a:r>
+          </a:p>
+          <a:p>
+            <a:pPr algn="ctr"/>
+            <a:r>
+              <a:rPr lang="nb-NO" sz="1100" dirty="0"/>
+              <a:t>DPI 3 N33 30.735  E036 </a:t>
+            </a:r>
+            <a:r>
+              <a:rPr lang="nb-NO" sz="1100"/>
+              <a:t>16.723/2260ft/(2000 </a:t>
+            </a:r>
+            <a:r>
+              <a:rPr lang="nb-NO" sz="1100" dirty="0"/>
+              <a:t>lbs bomb)</a:t>
+            </a:r>
+          </a:p>
+          <a:p>
+            <a:pPr algn="ctr"/>
+            <a:endParaRPr lang="nb-NO" sz="1100" dirty="0"/>
+          </a:p>
+          <a:p>
+            <a:pPr algn="ctr"/>
+            <a:r>
+              <a:rPr lang="pl-PL" sz="1000" dirty="0"/>
+              <a:t>Suggested fuzing solution on DPI</a:t>
+            </a:r>
+            <a:r>
+              <a:rPr lang="en-GB" sz="1000" dirty="0"/>
+              <a:t> 3</a:t>
+            </a:r>
+            <a:r>
+              <a:rPr lang="pl-PL" sz="1000" dirty="0"/>
+              <a:t> –</a:t>
+            </a:r>
+            <a:r>
+              <a:rPr lang="en-GB" sz="1000" dirty="0"/>
+              <a:t>Delayed fusing required in order to effect the servers located in the basement.</a:t>
+            </a:r>
+            <a:r>
+              <a:rPr lang="nb-NO" sz="1000" dirty="0"/>
+              <a:t> </a:t>
+            </a:r>
+            <a:endParaRPr lang="pl-PL" sz="1000" dirty="0"/>
           </a:p>
         </p:txBody>
       </p:sp>
@@ -4638,12 +4692,12 @@
               <a:buChar char="-"/>
             </a:pPr>
             <a:r>
-              <a:rPr lang="pl-PL" sz="1200" dirty="0" smtClean="0"/>
-              <a:t> Residential </a:t>
-            </a:r>
-            <a:r>
-              <a:rPr lang="en-GB" sz="1200" dirty="0" smtClean="0"/>
-              <a:t>and civilian infrastructure surround the communications centre.</a:t>
+              <a:rPr lang="pl-PL" sz="1200" dirty="0"/>
+              <a:t> </a:t>
+            </a:r>
+            <a:r>
+              <a:rPr lang="en-GB" sz="1200" dirty="0"/>
+              <a:t>Collateral damage concerns surround the centre.</a:t>
             </a:r>
             <a:endParaRPr lang="nb-NO" sz="1200" dirty="0"/>
           </a:p>
@@ -4651,24 +4705,125 @@
       </p:sp>
       <p:sp>
         <p:nvSpPr>
-          <p:cNvPr id="77" name="Prostokąt 76"/>
+          <p:cNvPr id="36" name="Freeform 35"/>
           <p:cNvSpPr/>
           <p:nvPr/>
         </p:nvSpPr>
         <p:spPr>
           <a:xfrm>
-            <a:off x="3857620" y="1928808"/>
-            <a:ext cx="1285884" cy="214314"/>
-          </a:xfrm>
-          <a:prstGeom prst="rect">
-            <a:avLst/>
-          </a:prstGeom>
+            <a:off x="2968625" y="2603500"/>
+            <a:ext cx="400050" cy="358775"/>
+          </a:xfrm>
+          <a:custGeom>
+            <a:avLst/>
+            <a:gdLst>
+              <a:gd name="connsiteX0" fmla="*/ 200025 w 400050"/>
+              <a:gd name="connsiteY0" fmla="*/ 0 h 358775"/>
+              <a:gd name="connsiteX1" fmla="*/ 393700 w 400050"/>
+              <a:gd name="connsiteY1" fmla="*/ 88900 h 358775"/>
+              <a:gd name="connsiteX2" fmla="*/ 400050 w 400050"/>
+              <a:gd name="connsiteY2" fmla="*/ 200025 h 358775"/>
+              <a:gd name="connsiteX3" fmla="*/ 377825 w 400050"/>
+              <a:gd name="connsiteY3" fmla="*/ 206375 h 358775"/>
+              <a:gd name="connsiteX4" fmla="*/ 374650 w 400050"/>
+              <a:gd name="connsiteY4" fmla="*/ 238125 h 358775"/>
+              <a:gd name="connsiteX5" fmla="*/ 152400 w 400050"/>
+              <a:gd name="connsiteY5" fmla="*/ 304800 h 358775"/>
+              <a:gd name="connsiteX6" fmla="*/ 146050 w 400050"/>
+              <a:gd name="connsiteY6" fmla="*/ 358775 h 358775"/>
+              <a:gd name="connsiteX7" fmla="*/ 69850 w 400050"/>
+              <a:gd name="connsiteY7" fmla="*/ 333375 h 358775"/>
+              <a:gd name="connsiteX8" fmla="*/ 57150 w 400050"/>
+              <a:gd name="connsiteY8" fmla="*/ 66675 h 358775"/>
+              <a:gd name="connsiteX9" fmla="*/ 0 w 400050"/>
+              <a:gd name="connsiteY9" fmla="*/ 50800 h 358775"/>
+              <a:gd name="connsiteX10" fmla="*/ 200025 w 400050"/>
+              <a:gd name="connsiteY10" fmla="*/ 0 h 358775"/>
+            </a:gdLst>
+            <a:ahLst/>
+            <a:cxnLst>
+              <a:cxn ang="0">
+                <a:pos x="connsiteX0" y="connsiteY0"/>
+              </a:cxn>
+              <a:cxn ang="0">
+                <a:pos x="connsiteX1" y="connsiteY1"/>
+              </a:cxn>
+              <a:cxn ang="0">
+                <a:pos x="connsiteX2" y="connsiteY2"/>
+              </a:cxn>
+              <a:cxn ang="0">
+                <a:pos x="connsiteX3" y="connsiteY3"/>
+              </a:cxn>
+              <a:cxn ang="0">
+                <a:pos x="connsiteX4" y="connsiteY4"/>
+              </a:cxn>
+              <a:cxn ang="0">
+                <a:pos x="connsiteX5" y="connsiteY5"/>
+              </a:cxn>
+              <a:cxn ang="0">
+                <a:pos x="connsiteX6" y="connsiteY6"/>
+              </a:cxn>
+              <a:cxn ang="0">
+                <a:pos x="connsiteX7" y="connsiteY7"/>
+              </a:cxn>
+              <a:cxn ang="0">
+                <a:pos x="connsiteX8" y="connsiteY8"/>
+              </a:cxn>
+              <a:cxn ang="0">
+                <a:pos x="connsiteX9" y="connsiteY9"/>
+              </a:cxn>
+              <a:cxn ang="0">
+                <a:pos x="connsiteX10" y="connsiteY10"/>
+              </a:cxn>
+            </a:cxnLst>
+            <a:rect l="l" t="t" r="r" b="b"/>
+            <a:pathLst>
+              <a:path w="400050" h="358775">
+                <a:moveTo>
+                  <a:pt x="200025" y="0"/>
+                </a:moveTo>
+                <a:lnTo>
+                  <a:pt x="393700" y="88900"/>
+                </a:lnTo>
+                <a:lnTo>
+                  <a:pt x="400050" y="200025"/>
+                </a:lnTo>
+                <a:lnTo>
+                  <a:pt x="377825" y="206375"/>
+                </a:lnTo>
+                <a:lnTo>
+                  <a:pt x="374650" y="238125"/>
+                </a:lnTo>
+                <a:lnTo>
+                  <a:pt x="152400" y="304800"/>
+                </a:lnTo>
+                <a:lnTo>
+                  <a:pt x="146050" y="358775"/>
+                </a:lnTo>
+                <a:lnTo>
+                  <a:pt x="69850" y="333375"/>
+                </a:lnTo>
+                <a:lnTo>
+                  <a:pt x="57150" y="66675"/>
+                </a:lnTo>
+                <a:lnTo>
+                  <a:pt x="0" y="50800"/>
+                </a:lnTo>
+                <a:lnTo>
+                  <a:pt x="200025" y="0"/>
+                </a:lnTo>
+                <a:close/>
+              </a:path>
+            </a:pathLst>
+          </a:custGeom>
           <a:solidFill>
-            <a:schemeClr val="bg1"/>
+            <a:srgbClr val="FFC000">
+              <a:alpha val="35000"/>
+            </a:srgbClr>
           </a:solidFill>
-          <a:ln w="19050">
+          <a:ln>
             <a:solidFill>
-              <a:schemeClr val="tx1"/>
+              <a:srgbClr val="FFC000"/>
             </a:solidFill>
           </a:ln>
         </p:spPr>
@@ -4689,56 +4844,35 @@
           </a:fontRef>
         </p:style>
         <p:txBody>
-          <a:bodyPr lIns="36000" rIns="36000" rtlCol="0" anchor="ctr"/>
+          <a:bodyPr rtlCol="0" anchor="ctr"/>
           <a:lstStyle/>
           <a:p>
             <a:pPr algn="ctr"/>
-            <a:r>
-              <a:rPr lang="pl-PL" sz="1200" dirty="0" err="1" smtClean="0">
-                <a:solidFill>
-                  <a:sysClr val="windowText" lastClr="000000"/>
-                </a:solidFill>
-              </a:rPr>
-              <a:t>Assembly</a:t>
-            </a:r>
-            <a:r>
-              <a:rPr lang="pl-PL" sz="1200" dirty="0" smtClean="0">
-                <a:solidFill>
-                  <a:sysClr val="windowText" lastClr="000000"/>
-                </a:solidFill>
-              </a:rPr>
-              <a:t> Plant</a:t>
-            </a:r>
-            <a:endParaRPr lang="pl-PL" sz="1200" dirty="0">
-              <a:solidFill>
-                <a:sysClr val="windowText" lastClr="000000"/>
-              </a:solidFill>
-            </a:endParaRPr>
+            <a:endParaRPr lang="en-US"/>
           </a:p>
         </p:txBody>
       </p:sp>
       <p:cxnSp>
         <p:nvCxnSpPr>
-          <p:cNvPr id="78" name="Łącznik prosty ze strzałką 77"/>
+          <p:cNvPr id="32" name="Straight Arrow Connector 31"/>
           <p:cNvCxnSpPr>
-            <a:stCxn id="77" idx="1"/>
+            <a:stCxn id="40" idx="2"/>
           </p:cNvCxnSpPr>
           <p:nvPr/>
         </p:nvCxnSpPr>
         <p:spPr>
-          <a:xfrm rot="10800000" flipV="1">
-            <a:off x="2749732" y="2035964"/>
-            <a:ext cx="1107889" cy="367601"/>
+          <a:xfrm flipH="1">
+            <a:off x="3131840" y="1491630"/>
+            <a:ext cx="180020" cy="1080120"/>
           </a:xfrm>
           <a:prstGeom prst="straightConnector1">
             <a:avLst/>
           </a:prstGeom>
-          <a:ln>
+          <a:ln w="19050">
             <a:solidFill>
-              <a:schemeClr val="bg1"/>
+              <a:srgbClr val="FF0D0D"/>
             </a:solidFill>
-            <a:headEnd type="none" w="med" len="med"/>
-            <a:tailEnd type="triangle" w="med" len="med"/>
+            <a:tailEnd type="arrow"/>
           </a:ln>
         </p:spPr>
         <p:style>
@@ -4756,30 +4890,608 @@
           </a:fontRef>
         </p:style>
       </p:cxnSp>
-      <p:pic>
-        <p:nvPicPr>
-          <p:cNvPr id="43" name="Picture 42" descr="Screen_201129_154014.png"/>
-          <p:cNvPicPr>
-            <a:picLocks noChangeAspect="1"/>
-          </p:cNvPicPr>
+      <p:sp>
+        <p:nvSpPr>
+          <p:cNvPr id="37" name="Freeform 36"/>
+          <p:cNvSpPr/>
           <p:nvPr/>
-        </p:nvPicPr>
-        <p:blipFill>
-          <a:blip r:embed="rId3" cstate="print"/>
-          <a:stretch>
-            <a:fillRect/>
-          </a:stretch>
-        </p:blipFill>
-        <p:spPr>
-          <a:xfrm>
-            <a:off x="25756" y="843558"/>
-            <a:ext cx="5652120" cy="3744416"/>
+        </p:nvSpPr>
+        <p:spPr>
+          <a:xfrm>
+            <a:off x="3807619" y="2726531"/>
+            <a:ext cx="319087" cy="238125"/>
+          </a:xfrm>
+          <a:custGeom>
+            <a:avLst/>
+            <a:gdLst>
+              <a:gd name="connsiteX0" fmla="*/ 0 w 319087"/>
+              <a:gd name="connsiteY0" fmla="*/ 64294 h 238125"/>
+              <a:gd name="connsiteX1" fmla="*/ 178594 w 319087"/>
+              <a:gd name="connsiteY1" fmla="*/ 0 h 238125"/>
+              <a:gd name="connsiteX2" fmla="*/ 319087 w 319087"/>
+              <a:gd name="connsiteY2" fmla="*/ 52388 h 238125"/>
+              <a:gd name="connsiteX3" fmla="*/ 314325 w 319087"/>
+              <a:gd name="connsiteY3" fmla="*/ 161925 h 238125"/>
+              <a:gd name="connsiteX4" fmla="*/ 114300 w 319087"/>
+              <a:gd name="connsiteY4" fmla="*/ 238125 h 238125"/>
+              <a:gd name="connsiteX5" fmla="*/ 38100 w 319087"/>
+              <a:gd name="connsiteY5" fmla="*/ 207169 h 238125"/>
+              <a:gd name="connsiteX6" fmla="*/ 0 w 319087"/>
+              <a:gd name="connsiteY6" fmla="*/ 64294 h 238125"/>
+            </a:gdLst>
+            <a:ahLst/>
+            <a:cxnLst>
+              <a:cxn ang="0">
+                <a:pos x="connsiteX0" y="connsiteY0"/>
+              </a:cxn>
+              <a:cxn ang="0">
+                <a:pos x="connsiteX1" y="connsiteY1"/>
+              </a:cxn>
+              <a:cxn ang="0">
+                <a:pos x="connsiteX2" y="connsiteY2"/>
+              </a:cxn>
+              <a:cxn ang="0">
+                <a:pos x="connsiteX3" y="connsiteY3"/>
+              </a:cxn>
+              <a:cxn ang="0">
+                <a:pos x="connsiteX4" y="connsiteY4"/>
+              </a:cxn>
+              <a:cxn ang="0">
+                <a:pos x="connsiteX5" y="connsiteY5"/>
+              </a:cxn>
+              <a:cxn ang="0">
+                <a:pos x="connsiteX6" y="connsiteY6"/>
+              </a:cxn>
+            </a:cxnLst>
+            <a:rect l="l" t="t" r="r" b="b"/>
+            <a:pathLst>
+              <a:path w="319087" h="238125">
+                <a:moveTo>
+                  <a:pt x="0" y="64294"/>
+                </a:moveTo>
+                <a:lnTo>
+                  <a:pt x="178594" y="0"/>
+                </a:lnTo>
+                <a:lnTo>
+                  <a:pt x="319087" y="52388"/>
+                </a:lnTo>
+                <a:lnTo>
+                  <a:pt x="314325" y="161925"/>
+                </a:lnTo>
+                <a:lnTo>
+                  <a:pt x="114300" y="238125"/>
+                </a:lnTo>
+                <a:lnTo>
+                  <a:pt x="38100" y="207169"/>
+                </a:lnTo>
+                <a:lnTo>
+                  <a:pt x="0" y="64294"/>
+                </a:lnTo>
+                <a:close/>
+              </a:path>
+            </a:pathLst>
+          </a:custGeom>
+          <a:solidFill>
+            <a:srgbClr val="FFC000">
+              <a:alpha val="35000"/>
+            </a:srgbClr>
+          </a:solidFill>
+          <a:ln w="22225">
+            <a:solidFill>
+              <a:srgbClr val="FFC000"/>
+            </a:solidFill>
+          </a:ln>
+        </p:spPr>
+        <p:style>
+          <a:lnRef idx="2">
+            <a:schemeClr val="accent1">
+              <a:shade val="50000"/>
+            </a:schemeClr>
+          </a:lnRef>
+          <a:fillRef idx="1">
+            <a:schemeClr val="accent1"/>
+          </a:fillRef>
+          <a:effectRef idx="0">
+            <a:schemeClr val="accent1"/>
+          </a:effectRef>
+          <a:fontRef idx="minor">
+            <a:schemeClr val="lt1"/>
+          </a:fontRef>
+        </p:style>
+        <p:txBody>
+          <a:bodyPr rtlCol="0" anchor="ctr"/>
+          <a:lstStyle/>
+          <a:p>
+            <a:pPr algn="ctr"/>
+            <a:endParaRPr lang="en-US"/>
+          </a:p>
+        </p:txBody>
+      </p:sp>
+      <p:cxnSp>
+        <p:nvCxnSpPr>
+          <p:cNvPr id="39" name="Straight Arrow Connector 38"/>
+          <p:cNvCxnSpPr/>
+          <p:nvPr/>
+        </p:nvCxnSpPr>
+        <p:spPr>
+          <a:xfrm flipH="1" flipV="1">
+            <a:off x="4067381" y="2955042"/>
+            <a:ext cx="648072" cy="504056"/>
+          </a:xfrm>
+          <a:prstGeom prst="straightConnector1">
+            <a:avLst/>
+          </a:prstGeom>
+          <a:ln w="19050">
+            <a:solidFill>
+              <a:srgbClr val="FF0D0D"/>
+            </a:solidFill>
+            <a:tailEnd type="arrow"/>
+          </a:ln>
+        </p:spPr>
+        <p:style>
+          <a:lnRef idx="1">
+            <a:schemeClr val="accent1"/>
+          </a:lnRef>
+          <a:fillRef idx="0">
+            <a:schemeClr val="accent1"/>
+          </a:fillRef>
+          <a:effectRef idx="0">
+            <a:schemeClr val="accent1"/>
+          </a:effectRef>
+          <a:fontRef idx="minor">
+            <a:schemeClr val="tx1"/>
+          </a:fontRef>
+        </p:style>
+      </p:cxnSp>
+      <p:sp>
+        <p:nvSpPr>
+          <p:cNvPr id="40" name="Prostokąt 76"/>
+          <p:cNvSpPr/>
+          <p:nvPr/>
+        </p:nvSpPr>
+        <p:spPr>
+          <a:xfrm>
+            <a:off x="2411760" y="1131590"/>
+            <a:ext cx="1800200" cy="360040"/>
           </a:xfrm>
           <a:prstGeom prst="rect">
             <a:avLst/>
           </a:prstGeom>
-        </p:spPr>
-      </p:pic>
+          <a:solidFill>
+            <a:schemeClr val="bg1"/>
+          </a:solidFill>
+          <a:ln w="19050">
+            <a:solidFill>
+              <a:schemeClr val="tx1"/>
+            </a:solidFill>
+          </a:ln>
+        </p:spPr>
+        <p:style>
+          <a:lnRef idx="2">
+            <a:schemeClr val="accent1">
+              <a:shade val="50000"/>
+            </a:schemeClr>
+          </a:lnRef>
+          <a:fillRef idx="1">
+            <a:schemeClr val="accent1"/>
+          </a:fillRef>
+          <a:effectRef idx="0">
+            <a:schemeClr val="accent1"/>
+          </a:effectRef>
+          <a:fontRef idx="minor">
+            <a:schemeClr val="lt1"/>
+          </a:fontRef>
+        </p:style>
+        <p:txBody>
+          <a:bodyPr lIns="36000" rIns="36000" rtlCol="0" anchor="ctr"/>
+          <a:lstStyle/>
+          <a:p>
+            <a:pPr algn="ctr"/>
+            <a:r>
+              <a:rPr lang="en-GB" sz="1000" dirty="0">
+                <a:solidFill>
+                  <a:sysClr val="windowText" lastClr="000000"/>
+                </a:solidFill>
+              </a:rPr>
+              <a:t>DPI 1-2</a:t>
+            </a:r>
+          </a:p>
+          <a:p>
+            <a:pPr algn="ctr"/>
+            <a:r>
+              <a:rPr lang="en-GB" sz="1000" dirty="0">
+                <a:solidFill>
+                  <a:sysClr val="windowText" lastClr="000000"/>
+                </a:solidFill>
+              </a:rPr>
+              <a:t>Syrian Armed Forces Propaganda</a:t>
+            </a:r>
+          </a:p>
+        </p:txBody>
+      </p:sp>
+      <p:sp>
+        <p:nvSpPr>
+          <p:cNvPr id="48" name="Freeform 47"/>
+          <p:cNvSpPr/>
+          <p:nvPr/>
+        </p:nvSpPr>
+        <p:spPr>
+          <a:xfrm>
+            <a:off x="3348038" y="2745581"/>
+            <a:ext cx="490537" cy="269082"/>
+          </a:xfrm>
+          <a:custGeom>
+            <a:avLst/>
+            <a:gdLst>
+              <a:gd name="connsiteX0" fmla="*/ 169068 w 490537"/>
+              <a:gd name="connsiteY0" fmla="*/ 0 h 269082"/>
+              <a:gd name="connsiteX1" fmla="*/ 0 w 490537"/>
+              <a:gd name="connsiteY1" fmla="*/ 64294 h 269082"/>
+              <a:gd name="connsiteX2" fmla="*/ 0 w 490537"/>
+              <a:gd name="connsiteY2" fmla="*/ 126207 h 269082"/>
+              <a:gd name="connsiteX3" fmla="*/ 228600 w 490537"/>
+              <a:gd name="connsiteY3" fmla="*/ 192882 h 269082"/>
+              <a:gd name="connsiteX4" fmla="*/ 223837 w 490537"/>
+              <a:gd name="connsiteY4" fmla="*/ 269082 h 269082"/>
+              <a:gd name="connsiteX5" fmla="*/ 245268 w 490537"/>
+              <a:gd name="connsiteY5" fmla="*/ 269082 h 269082"/>
+              <a:gd name="connsiteX6" fmla="*/ 490537 w 490537"/>
+              <a:gd name="connsiteY6" fmla="*/ 178594 h 269082"/>
+              <a:gd name="connsiteX7" fmla="*/ 464343 w 490537"/>
+              <a:gd name="connsiteY7" fmla="*/ 42863 h 269082"/>
+              <a:gd name="connsiteX8" fmla="*/ 361950 w 490537"/>
+              <a:gd name="connsiteY8" fmla="*/ 7144 h 269082"/>
+              <a:gd name="connsiteX9" fmla="*/ 169068 w 490537"/>
+              <a:gd name="connsiteY9" fmla="*/ 0 h 269082"/>
+            </a:gdLst>
+            <a:ahLst/>
+            <a:cxnLst>
+              <a:cxn ang="0">
+                <a:pos x="connsiteX0" y="connsiteY0"/>
+              </a:cxn>
+              <a:cxn ang="0">
+                <a:pos x="connsiteX1" y="connsiteY1"/>
+              </a:cxn>
+              <a:cxn ang="0">
+                <a:pos x="connsiteX2" y="connsiteY2"/>
+              </a:cxn>
+              <a:cxn ang="0">
+                <a:pos x="connsiteX3" y="connsiteY3"/>
+              </a:cxn>
+              <a:cxn ang="0">
+                <a:pos x="connsiteX4" y="connsiteY4"/>
+              </a:cxn>
+              <a:cxn ang="0">
+                <a:pos x="connsiteX5" y="connsiteY5"/>
+              </a:cxn>
+              <a:cxn ang="0">
+                <a:pos x="connsiteX6" y="connsiteY6"/>
+              </a:cxn>
+              <a:cxn ang="0">
+                <a:pos x="connsiteX7" y="connsiteY7"/>
+              </a:cxn>
+              <a:cxn ang="0">
+                <a:pos x="connsiteX8" y="connsiteY8"/>
+              </a:cxn>
+              <a:cxn ang="0">
+                <a:pos x="connsiteX9" y="connsiteY9"/>
+              </a:cxn>
+            </a:cxnLst>
+            <a:rect l="l" t="t" r="r" b="b"/>
+            <a:pathLst>
+              <a:path w="490537" h="269082">
+                <a:moveTo>
+                  <a:pt x="169068" y="0"/>
+                </a:moveTo>
+                <a:lnTo>
+                  <a:pt x="0" y="64294"/>
+                </a:lnTo>
+                <a:lnTo>
+                  <a:pt x="0" y="126207"/>
+                </a:lnTo>
+                <a:lnTo>
+                  <a:pt x="228600" y="192882"/>
+                </a:lnTo>
+                <a:lnTo>
+                  <a:pt x="223837" y="269082"/>
+                </a:lnTo>
+                <a:lnTo>
+                  <a:pt x="245268" y="269082"/>
+                </a:lnTo>
+                <a:lnTo>
+                  <a:pt x="490537" y="178594"/>
+                </a:lnTo>
+                <a:lnTo>
+                  <a:pt x="464343" y="42863"/>
+                </a:lnTo>
+                <a:lnTo>
+                  <a:pt x="361950" y="7144"/>
+                </a:lnTo>
+                <a:lnTo>
+                  <a:pt x="169068" y="0"/>
+                </a:lnTo>
+                <a:close/>
+              </a:path>
+            </a:pathLst>
+          </a:custGeom>
+          <a:solidFill>
+            <a:srgbClr val="FFC000">
+              <a:alpha val="35000"/>
+            </a:srgbClr>
+          </a:solidFill>
+          <a:ln>
+            <a:solidFill>
+              <a:srgbClr val="FFC000"/>
+            </a:solidFill>
+          </a:ln>
+        </p:spPr>
+        <p:style>
+          <a:lnRef idx="2">
+            <a:schemeClr val="accent1">
+              <a:shade val="50000"/>
+            </a:schemeClr>
+          </a:lnRef>
+          <a:fillRef idx="1">
+            <a:schemeClr val="accent1"/>
+          </a:fillRef>
+          <a:effectRef idx="0">
+            <a:schemeClr val="accent1"/>
+          </a:effectRef>
+          <a:fontRef idx="minor">
+            <a:schemeClr val="lt1"/>
+          </a:fontRef>
+        </p:style>
+        <p:txBody>
+          <a:bodyPr rtlCol="0" anchor="ctr"/>
+          <a:lstStyle/>
+          <a:p>
+            <a:pPr algn="ctr"/>
+            <a:endParaRPr lang="en-US"/>
+          </a:p>
+        </p:txBody>
+      </p:sp>
+      <p:sp>
+        <p:nvSpPr>
+          <p:cNvPr id="77" name="Prostokąt 76"/>
+          <p:cNvSpPr/>
+          <p:nvPr/>
+        </p:nvSpPr>
+        <p:spPr>
+          <a:xfrm>
+            <a:off x="3707904" y="3363838"/>
+            <a:ext cx="1872208" cy="286322"/>
+          </a:xfrm>
+          <a:prstGeom prst="rect">
+            <a:avLst/>
+          </a:prstGeom>
+          <a:solidFill>
+            <a:schemeClr val="bg1"/>
+          </a:solidFill>
+          <a:ln w="19050">
+            <a:solidFill>
+              <a:schemeClr val="tx1"/>
+            </a:solidFill>
+          </a:ln>
+        </p:spPr>
+        <p:style>
+          <a:lnRef idx="2">
+            <a:schemeClr val="accent1">
+              <a:shade val="50000"/>
+            </a:schemeClr>
+          </a:lnRef>
+          <a:fillRef idx="1">
+            <a:schemeClr val="accent1"/>
+          </a:fillRef>
+          <a:effectRef idx="0">
+            <a:schemeClr val="accent1"/>
+          </a:effectRef>
+          <a:fontRef idx="minor">
+            <a:schemeClr val="lt1"/>
+          </a:fontRef>
+        </p:style>
+        <p:txBody>
+          <a:bodyPr lIns="36000" rIns="36000" rtlCol="0" anchor="ctr"/>
+          <a:lstStyle/>
+          <a:p>
+            <a:pPr algn="ctr"/>
+            <a:r>
+              <a:rPr lang="en-GB" sz="1000" dirty="0">
+                <a:solidFill>
+                  <a:sysClr val="windowText" lastClr="000000"/>
+                </a:solidFill>
+              </a:rPr>
+              <a:t>DPI 3.  Syrian Armed Forces Backup Servers.</a:t>
+            </a:r>
+            <a:endParaRPr lang="pl-PL" sz="1000" dirty="0">
+              <a:solidFill>
+                <a:sysClr val="windowText" lastClr="000000"/>
+              </a:solidFill>
+            </a:endParaRPr>
+          </a:p>
+        </p:txBody>
+      </p:sp>
+      <p:cxnSp>
+        <p:nvCxnSpPr>
+          <p:cNvPr id="52" name="Straight Arrow Connector 51"/>
+          <p:cNvCxnSpPr>
+            <a:stCxn id="40" idx="2"/>
+          </p:cNvCxnSpPr>
+          <p:nvPr/>
+        </p:nvCxnSpPr>
+        <p:spPr>
+          <a:xfrm>
+            <a:off x="3311860" y="1491630"/>
+            <a:ext cx="252028" cy="1224136"/>
+          </a:xfrm>
+          <a:prstGeom prst="straightConnector1">
+            <a:avLst/>
+          </a:prstGeom>
+          <a:ln w="19050">
+            <a:solidFill>
+              <a:srgbClr val="FF0D0D"/>
+            </a:solidFill>
+            <a:tailEnd type="arrow"/>
+          </a:ln>
+        </p:spPr>
+        <p:style>
+          <a:lnRef idx="1">
+            <a:schemeClr val="accent1"/>
+          </a:lnRef>
+          <a:fillRef idx="0">
+            <a:schemeClr val="accent1"/>
+          </a:fillRef>
+          <a:effectRef idx="0">
+            <a:schemeClr val="accent1"/>
+          </a:effectRef>
+          <a:fontRef idx="minor">
+            <a:schemeClr val="tx1"/>
+          </a:fontRef>
+        </p:style>
+      </p:cxnSp>
+      <p:sp>
+        <p:nvSpPr>
+          <p:cNvPr id="56" name="4-Point Star 55"/>
+          <p:cNvSpPr/>
+          <p:nvPr/>
+        </p:nvSpPr>
+        <p:spPr>
+          <a:xfrm>
+            <a:off x="3086023" y="2636615"/>
+            <a:ext cx="122312" cy="122312"/>
+          </a:xfrm>
+          <a:prstGeom prst="star4">
+            <a:avLst/>
+          </a:prstGeom>
+          <a:solidFill>
+            <a:srgbClr val="FF0D0D"/>
+          </a:solidFill>
+          <a:ln>
+            <a:solidFill>
+              <a:srgbClr val="FF0D0D"/>
+            </a:solidFill>
+          </a:ln>
+        </p:spPr>
+        <p:style>
+          <a:lnRef idx="2">
+            <a:schemeClr val="accent1">
+              <a:shade val="50000"/>
+            </a:schemeClr>
+          </a:lnRef>
+          <a:fillRef idx="1">
+            <a:schemeClr val="accent1"/>
+          </a:fillRef>
+          <a:effectRef idx="0">
+            <a:schemeClr val="accent1"/>
+          </a:effectRef>
+          <a:fontRef idx="minor">
+            <a:schemeClr val="lt1"/>
+          </a:fontRef>
+        </p:style>
+        <p:txBody>
+          <a:bodyPr rtlCol="0" anchor="ctr"/>
+          <a:lstStyle/>
+          <a:p>
+            <a:pPr algn="ctr"/>
+            <a:endParaRPr lang="en-US"/>
+          </a:p>
+        </p:txBody>
+      </p:sp>
+      <p:sp>
+        <p:nvSpPr>
+          <p:cNvPr id="57" name="4-Point Star 56"/>
+          <p:cNvSpPr/>
+          <p:nvPr/>
+        </p:nvSpPr>
+        <p:spPr>
+          <a:xfrm>
+            <a:off x="3518071" y="2766345"/>
+            <a:ext cx="122312" cy="122312"/>
+          </a:xfrm>
+          <a:prstGeom prst="star4">
+            <a:avLst/>
+          </a:prstGeom>
+          <a:solidFill>
+            <a:srgbClr val="FF0D0D"/>
+          </a:solidFill>
+          <a:ln>
+            <a:solidFill>
+              <a:srgbClr val="FF0D0D"/>
+            </a:solidFill>
+          </a:ln>
+        </p:spPr>
+        <p:style>
+          <a:lnRef idx="2">
+            <a:schemeClr val="accent1">
+              <a:shade val="50000"/>
+            </a:schemeClr>
+          </a:lnRef>
+          <a:fillRef idx="1">
+            <a:schemeClr val="accent1"/>
+          </a:fillRef>
+          <a:effectRef idx="0">
+            <a:schemeClr val="accent1"/>
+          </a:effectRef>
+          <a:fontRef idx="minor">
+            <a:schemeClr val="lt1"/>
+          </a:fontRef>
+        </p:style>
+        <p:txBody>
+          <a:bodyPr rtlCol="0" anchor="ctr"/>
+          <a:lstStyle/>
+          <a:p>
+            <a:pPr algn="ctr"/>
+            <a:endParaRPr lang="en-US"/>
+          </a:p>
+        </p:txBody>
+      </p:sp>
+      <p:sp>
+        <p:nvSpPr>
+          <p:cNvPr id="58" name="4-Point Star 57"/>
+          <p:cNvSpPr/>
+          <p:nvPr/>
+        </p:nvSpPr>
+        <p:spPr>
+          <a:xfrm>
+            <a:off x="3923928" y="2787774"/>
+            <a:ext cx="122312" cy="122312"/>
+          </a:xfrm>
+          <a:prstGeom prst="star4">
+            <a:avLst/>
+          </a:prstGeom>
+          <a:solidFill>
+            <a:srgbClr val="FF0D0D"/>
+          </a:solidFill>
+          <a:ln>
+            <a:solidFill>
+              <a:srgbClr val="FF0D0D"/>
+            </a:solidFill>
+          </a:ln>
+        </p:spPr>
+        <p:style>
+          <a:lnRef idx="2">
+            <a:schemeClr val="accent1">
+              <a:shade val="50000"/>
+            </a:schemeClr>
+          </a:lnRef>
+          <a:fillRef idx="1">
+            <a:schemeClr val="accent1"/>
+          </a:fillRef>
+          <a:effectRef idx="0">
+            <a:schemeClr val="accent1"/>
+          </a:effectRef>
+          <a:fontRef idx="minor">
+            <a:schemeClr val="lt1"/>
+          </a:fontRef>
+        </p:style>
+        <p:txBody>
+          <a:bodyPr rtlCol="0" anchor="ctr"/>
+          <a:lstStyle/>
+          <a:p>
+            <a:pPr algn="ctr"/>
+            <a:endParaRPr lang="en-US"/>
+          </a:p>
+        </p:txBody>
+      </p:sp>
     </p:spTree>
   </p:cSld>
   <p:clrMapOvr>

</xml_diff>